<commit_message>
(presentatie) unity logo added
</commit_message>
<xml_diff>
--- a/Report/Presentatie_2.pptx
+++ b/Report/Presentatie_2.pptx
@@ -125,7 +125,7 @@
   </p:defaultTextStyle>
   <p:extLst>
     <p:ext uri="{EFAFB233-063F-42B5-8137-9DF3F51BA10A}">
-      <p15:sldGuideLst xmlns:p15="http://schemas.microsoft.com/office/powerpoint/2012/main" xmlns="">
+      <p15:sldGuideLst xmlns="" xmlns:p15="http://schemas.microsoft.com/office/powerpoint/2012/main">
         <p15:guide id="1" orient="horz" pos="3072" userDrawn="1">
           <p15:clr>
             <a:srgbClr val="A4A3A4"/>
@@ -5816,7 +5816,7 @@
           <p:cNvPr id="6" name="Content Placeholder 5" descr="A circuit board&#10;&#10;Description generated with very high confidence">
             <a:extLst>
               <a:ext uri="{FF2B5EF4-FFF2-40B4-BE49-F238E27FC236}">
-                <a16:creationId xmlns:a16="http://schemas.microsoft.com/office/drawing/2014/main" xmlns="" id="{5DC46D9F-5DB3-407F-B27A-199B3FE0352B}"/>
+                <a16:creationId xmlns="" xmlns:a16="http://schemas.microsoft.com/office/drawing/2014/main" id="{5DC46D9F-5DB3-407F-B27A-199B3FE0352B}"/>
               </a:ext>
             </a:extLst>
           </p:cNvPr>
@@ -5852,7 +5852,7 @@
           <p:cNvPr id="18" name="Picture 17" descr="A close up of a computer&#10;&#10;Description generated with very high confidence">
             <a:extLst>
               <a:ext uri="{FF2B5EF4-FFF2-40B4-BE49-F238E27FC236}">
-                <a16:creationId xmlns:a16="http://schemas.microsoft.com/office/drawing/2014/main" xmlns="" id="{E9750424-21F3-4252-B2D0-92619F4A0BAD}"/>
+                <a16:creationId xmlns="" xmlns:a16="http://schemas.microsoft.com/office/drawing/2014/main" id="{E9750424-21F3-4252-B2D0-92619F4A0BAD}"/>
               </a:ext>
             </a:extLst>
           </p:cNvPr>
@@ -5918,7 +5918,7 @@
           <p:cNvPr id="31" name="Straight Connector 30">
             <a:extLst>
               <a:ext uri="{FF2B5EF4-FFF2-40B4-BE49-F238E27FC236}">
-                <a16:creationId xmlns:a16="http://schemas.microsoft.com/office/drawing/2014/main" xmlns="" id="{42965CAB-4FC4-44FC-974F-2A001BFFDAC2}"/>
+                <a16:creationId xmlns="" xmlns:a16="http://schemas.microsoft.com/office/drawing/2014/main" id="{42965CAB-4FC4-44FC-974F-2A001BFFDAC2}"/>
               </a:ext>
             </a:extLst>
           </p:cNvPr>
@@ -5961,7 +5961,7 @@
           <p:cNvPr id="10" name="Rectangle 9">
             <a:extLst>
               <a:ext uri="{FF2B5EF4-FFF2-40B4-BE49-F238E27FC236}">
-                <a16:creationId xmlns:a16="http://schemas.microsoft.com/office/drawing/2014/main" xmlns="" id="{E6FB14CB-AF01-40E5-B55A-B698917F5322}"/>
+                <a16:creationId xmlns="" xmlns:a16="http://schemas.microsoft.com/office/drawing/2014/main" id="{E6FB14CB-AF01-40E5-B55A-B698917F5322}"/>
               </a:ext>
             </a:extLst>
           </p:cNvPr>
@@ -6001,7 +6001,7 @@
           <p:cNvPr id="8" name="Rectangle 9">
             <a:extLst>
               <a:ext uri="{FF2B5EF4-FFF2-40B4-BE49-F238E27FC236}">
-                <a16:creationId xmlns:a16="http://schemas.microsoft.com/office/drawing/2014/main" xmlns="" id="{23F847A8-BB39-104A-905A-5C2CBD1228CB}"/>
+                <a16:creationId xmlns="" xmlns:a16="http://schemas.microsoft.com/office/drawing/2014/main" id="{23F847A8-BB39-104A-905A-5C2CBD1228CB}"/>
               </a:ext>
             </a:extLst>
           </p:cNvPr>
@@ -6040,7 +6040,7 @@
           <p:cNvPr id="9" name="Rectangle 9">
             <a:extLst>
               <a:ext uri="{FF2B5EF4-FFF2-40B4-BE49-F238E27FC236}">
-                <a16:creationId xmlns:a16="http://schemas.microsoft.com/office/drawing/2014/main" xmlns="" id="{0AA19BDF-AD92-7A4A-A12F-7E3E4651DE71}"/>
+                <a16:creationId xmlns="" xmlns:a16="http://schemas.microsoft.com/office/drawing/2014/main" id="{0AA19BDF-AD92-7A4A-A12F-7E3E4651DE71}"/>
               </a:ext>
             </a:extLst>
           </p:cNvPr>
@@ -6079,7 +6079,7 @@
           <p:cNvPr id="12" name="Afgeronde rechthoek 11">
             <a:extLst>
               <a:ext uri="{FF2B5EF4-FFF2-40B4-BE49-F238E27FC236}">
-                <a16:creationId xmlns:a16="http://schemas.microsoft.com/office/drawing/2014/main" xmlns="" id="{948EDBA3-5879-4C4E-9DA7-07DFFCB2F29D}"/>
+                <a16:creationId xmlns="" xmlns:a16="http://schemas.microsoft.com/office/drawing/2014/main" id="{948EDBA3-5879-4C4E-9DA7-07DFFCB2F29D}"/>
               </a:ext>
             </a:extLst>
           </p:cNvPr>
@@ -6140,7 +6140,7 @@
           <p:cNvPr id="21" name="Afgeronde rechthoek 20">
             <a:extLst>
               <a:ext uri="{FF2B5EF4-FFF2-40B4-BE49-F238E27FC236}">
-                <a16:creationId xmlns:a16="http://schemas.microsoft.com/office/drawing/2014/main" xmlns="" id="{51168160-DA0F-334F-A761-9505722CFD98}"/>
+                <a16:creationId xmlns="" xmlns:a16="http://schemas.microsoft.com/office/drawing/2014/main" id="{51168160-DA0F-334F-A761-9505722CFD98}"/>
               </a:ext>
             </a:extLst>
           </p:cNvPr>
@@ -6201,7 +6201,7 @@
           <p:cNvPr id="22" name="Straight Connector 30">
             <a:extLst>
               <a:ext uri="{FF2B5EF4-FFF2-40B4-BE49-F238E27FC236}">
-                <a16:creationId xmlns:a16="http://schemas.microsoft.com/office/drawing/2014/main" xmlns="" id="{7A759B4C-2D26-4242-84A0-96BB232DB786}"/>
+                <a16:creationId xmlns="" xmlns:a16="http://schemas.microsoft.com/office/drawing/2014/main" id="{7A759B4C-2D26-4242-84A0-96BB232DB786}"/>
               </a:ext>
             </a:extLst>
           </p:cNvPr>
@@ -6246,7 +6246,7 @@
           <p:cNvPr id="25" name="Rectangle 9">
             <a:extLst>
               <a:ext uri="{FF2B5EF4-FFF2-40B4-BE49-F238E27FC236}">
-                <a16:creationId xmlns:a16="http://schemas.microsoft.com/office/drawing/2014/main" xmlns="" id="{071612F6-9286-694F-804D-83A57870049B}"/>
+                <a16:creationId xmlns="" xmlns:a16="http://schemas.microsoft.com/office/drawing/2014/main" id="{071612F6-9286-694F-804D-83A57870049B}"/>
               </a:ext>
             </a:extLst>
           </p:cNvPr>
@@ -6285,7 +6285,7 @@
           <p:cNvPr id="27" name="Straight Connector 30">
             <a:extLst>
               <a:ext uri="{FF2B5EF4-FFF2-40B4-BE49-F238E27FC236}">
-                <a16:creationId xmlns:a16="http://schemas.microsoft.com/office/drawing/2014/main" xmlns="" id="{AEB4A00B-EA21-2D49-A0CF-320E483A87D7}"/>
+                <a16:creationId xmlns="" xmlns:a16="http://schemas.microsoft.com/office/drawing/2014/main" id="{AEB4A00B-EA21-2D49-A0CF-320E483A87D7}"/>
               </a:ext>
             </a:extLst>
           </p:cNvPr>
@@ -6330,7 +6330,7 @@
           <p:cNvPr id="28" name="Rectangle 9">
             <a:extLst>
               <a:ext uri="{FF2B5EF4-FFF2-40B4-BE49-F238E27FC236}">
-                <a16:creationId xmlns:a16="http://schemas.microsoft.com/office/drawing/2014/main" xmlns="" id="{58C0E4DF-DDF9-8443-9557-AAE6CE129AD5}"/>
+                <a16:creationId xmlns="" xmlns:a16="http://schemas.microsoft.com/office/drawing/2014/main" id="{58C0E4DF-DDF9-8443-9557-AAE6CE129AD5}"/>
               </a:ext>
             </a:extLst>
           </p:cNvPr>
@@ -6369,7 +6369,7 @@
           <p:cNvPr id="29" name="Straight Connector 30">
             <a:extLst>
               <a:ext uri="{FF2B5EF4-FFF2-40B4-BE49-F238E27FC236}">
-                <a16:creationId xmlns:a16="http://schemas.microsoft.com/office/drawing/2014/main" xmlns="" id="{7E6F7F88-C9CB-6E44-B17B-51B93ED27A69}"/>
+                <a16:creationId xmlns="" xmlns:a16="http://schemas.microsoft.com/office/drawing/2014/main" id="{7E6F7F88-C9CB-6E44-B17B-51B93ED27A69}"/>
               </a:ext>
             </a:extLst>
           </p:cNvPr>
@@ -6862,7 +6862,7 @@
           <p:cNvPr id="3" name="AutoShape 2" descr="Image result for raspberry pi 3 b">
             <a:extLst>
               <a:ext uri="{FF2B5EF4-FFF2-40B4-BE49-F238E27FC236}">
-                <a16:creationId xmlns:a16="http://schemas.microsoft.com/office/drawing/2014/main" xmlns="" id="{2D9EC92C-E5B9-4CDA-87B7-A5387AA2C251}"/>
+                <a16:creationId xmlns="" xmlns:a16="http://schemas.microsoft.com/office/drawing/2014/main" id="{2D9EC92C-E5B9-4CDA-87B7-A5387AA2C251}"/>
               </a:ext>
             </a:extLst>
           </p:cNvPr>
@@ -6907,7 +6907,7 @@
           <p:cNvPr id="8" name="AutoShape 4" descr="Image result for raspberry pi 3 b">
             <a:extLst>
               <a:ext uri="{FF2B5EF4-FFF2-40B4-BE49-F238E27FC236}">
-                <a16:creationId xmlns:a16="http://schemas.microsoft.com/office/drawing/2014/main" xmlns="" id="{6841FE8A-B955-49A4-BDE3-CAF4FB06AF82}"/>
+                <a16:creationId xmlns="" xmlns:a16="http://schemas.microsoft.com/office/drawing/2014/main" id="{6841FE8A-B955-49A4-BDE3-CAF4FB06AF82}"/>
               </a:ext>
             </a:extLst>
           </p:cNvPr>
@@ -6952,7 +6952,7 @@
           <p:cNvPr id="30" name="Content Placeholder 5" descr="A picture containing black, cat, rowel&#10;&#10;Description generated with very high confidence">
             <a:extLst>
               <a:ext uri="{FF2B5EF4-FFF2-40B4-BE49-F238E27FC236}">
-                <a16:creationId xmlns:a16="http://schemas.microsoft.com/office/drawing/2014/main" xmlns="" id="{B53693E4-8F58-43A8-96CF-B878F517DE97}"/>
+                <a16:creationId xmlns="" xmlns:a16="http://schemas.microsoft.com/office/drawing/2014/main" id="{B53693E4-8F58-43A8-96CF-B878F517DE97}"/>
               </a:ext>
             </a:extLst>
           </p:cNvPr>
@@ -6996,7 +6996,7 @@
           <p:cNvPr id="34" name="Content Placeholder 5" descr="A circuit board&#10;&#10;Description generated with very high confidence">
             <a:extLst>
               <a:ext uri="{FF2B5EF4-FFF2-40B4-BE49-F238E27FC236}">
-                <a16:creationId xmlns:a16="http://schemas.microsoft.com/office/drawing/2014/main" xmlns="" id="{107C5C5B-7642-4BB3-96E7-102A4DE5FD3C}"/>
+                <a16:creationId xmlns="" xmlns:a16="http://schemas.microsoft.com/office/drawing/2014/main" id="{107C5C5B-7642-4BB3-96E7-102A4DE5FD3C}"/>
               </a:ext>
             </a:extLst>
           </p:cNvPr>
@@ -7049,7 +7049,7 @@
           <p:cNvPr id="35" name="Content Placeholder 5" descr="A circuit board&#10;&#10;Description generated with very high confidence">
             <a:extLst>
               <a:ext uri="{FF2B5EF4-FFF2-40B4-BE49-F238E27FC236}">
-                <a16:creationId xmlns:a16="http://schemas.microsoft.com/office/drawing/2014/main" xmlns="" id="{A545AF84-9A17-4661-BAE8-4F98AC37CAB4}"/>
+                <a16:creationId xmlns="" xmlns:a16="http://schemas.microsoft.com/office/drawing/2014/main" id="{A545AF84-9A17-4661-BAE8-4F98AC37CAB4}"/>
               </a:ext>
             </a:extLst>
           </p:cNvPr>
@@ -7094,7 +7094,7 @@
           <p:cNvPr id="39" name="Content Placeholder 8" descr="A close up of a device&#10;&#10;Description generated with high confidence">
             <a:extLst>
               <a:ext uri="{FF2B5EF4-FFF2-40B4-BE49-F238E27FC236}">
-                <a16:creationId xmlns:a16="http://schemas.microsoft.com/office/drawing/2014/main" xmlns="" id="{8C46781D-4880-4D9D-97BC-99BCED8D11AD}"/>
+                <a16:creationId xmlns="" xmlns:a16="http://schemas.microsoft.com/office/drawing/2014/main" id="{8C46781D-4880-4D9D-97BC-99BCED8D11AD}"/>
               </a:ext>
             </a:extLst>
           </p:cNvPr>
@@ -7139,7 +7139,7 @@
           <p:cNvPr id="42" name="Straight Connector 41">
             <a:extLst>
               <a:ext uri="{FF2B5EF4-FFF2-40B4-BE49-F238E27FC236}">
-                <a16:creationId xmlns:a16="http://schemas.microsoft.com/office/drawing/2014/main" xmlns="" id="{46C4822D-EC9E-4DCD-9F57-77A47E0A417E}"/>
+                <a16:creationId xmlns="" xmlns:a16="http://schemas.microsoft.com/office/drawing/2014/main" id="{46C4822D-EC9E-4DCD-9F57-77A47E0A417E}"/>
               </a:ext>
             </a:extLst>
           </p:cNvPr>
@@ -7184,7 +7184,7 @@
           <p:cNvPr id="43" name="Straight Connector 42">
             <a:extLst>
               <a:ext uri="{FF2B5EF4-FFF2-40B4-BE49-F238E27FC236}">
-                <a16:creationId xmlns:a16="http://schemas.microsoft.com/office/drawing/2014/main" xmlns="" id="{FA080966-9266-44AE-87F3-B7E2DDB76C96}"/>
+                <a16:creationId xmlns="" xmlns:a16="http://schemas.microsoft.com/office/drawing/2014/main" id="{FA080966-9266-44AE-87F3-B7E2DDB76C96}"/>
               </a:ext>
             </a:extLst>
           </p:cNvPr>
@@ -7229,7 +7229,7 @@
           <p:cNvPr id="38" name="Picture 37" descr="A circuit board&#10;&#10;Description generated with very high confidence">
             <a:extLst>
               <a:ext uri="{FF2B5EF4-FFF2-40B4-BE49-F238E27FC236}">
-                <a16:creationId xmlns:a16="http://schemas.microsoft.com/office/drawing/2014/main" xmlns="" id="{72BCC989-6D2E-4BD7-9D79-3672AD2DF292}"/>
+                <a16:creationId xmlns="" xmlns:a16="http://schemas.microsoft.com/office/drawing/2014/main" id="{72BCC989-6D2E-4BD7-9D79-3672AD2DF292}"/>
               </a:ext>
             </a:extLst>
           </p:cNvPr>
@@ -7275,7 +7275,7 @@
           <p:cNvPr id="45" name="Straight Connector 44">
             <a:extLst>
               <a:ext uri="{FF2B5EF4-FFF2-40B4-BE49-F238E27FC236}">
-                <a16:creationId xmlns:a16="http://schemas.microsoft.com/office/drawing/2014/main" xmlns="" id="{BF4C1FA7-8D31-4B5E-8312-6F6DE79F2443}"/>
+                <a16:creationId xmlns="" xmlns:a16="http://schemas.microsoft.com/office/drawing/2014/main" id="{BF4C1FA7-8D31-4B5E-8312-6F6DE79F2443}"/>
               </a:ext>
             </a:extLst>
           </p:cNvPr>
@@ -7320,7 +7320,7 @@
           <p:cNvPr id="48" name="TextBox 47">
             <a:extLst>
               <a:ext uri="{FF2B5EF4-FFF2-40B4-BE49-F238E27FC236}">
-                <a16:creationId xmlns:a16="http://schemas.microsoft.com/office/drawing/2014/main" xmlns="" id="{A88978A6-38F2-4750-AE67-4CB36D6C9241}"/>
+                <a16:creationId xmlns="" xmlns:a16="http://schemas.microsoft.com/office/drawing/2014/main" id="{A88978A6-38F2-4750-AE67-4CB36D6C9241}"/>
               </a:ext>
             </a:extLst>
           </p:cNvPr>
@@ -7361,7 +7361,7 @@
           <p:cNvPr id="49" name="Picture 48" descr="A close up of a computer&#10;&#10;Description generated with very high confidence">
             <a:extLst>
               <a:ext uri="{FF2B5EF4-FFF2-40B4-BE49-F238E27FC236}">
-                <a16:creationId xmlns:a16="http://schemas.microsoft.com/office/drawing/2014/main" xmlns="" id="{88512F56-7837-4278-82D2-56ECA1C71367}"/>
+                <a16:creationId xmlns="" xmlns:a16="http://schemas.microsoft.com/office/drawing/2014/main" id="{88512F56-7837-4278-82D2-56ECA1C71367}"/>
               </a:ext>
             </a:extLst>
           </p:cNvPr>
@@ -7427,7 +7427,7 @@
           <p:cNvPr id="53" name="Content Placeholder 5" descr="A circuit board&#10;&#10;Description generated with very high confidence">
             <a:extLst>
               <a:ext uri="{FF2B5EF4-FFF2-40B4-BE49-F238E27FC236}">
-                <a16:creationId xmlns:a16="http://schemas.microsoft.com/office/drawing/2014/main" xmlns="" id="{551D223B-DE75-468D-BB6D-23371A598C32}"/>
+                <a16:creationId xmlns="" xmlns:a16="http://schemas.microsoft.com/office/drawing/2014/main" id="{551D223B-DE75-468D-BB6D-23371A598C32}"/>
               </a:ext>
             </a:extLst>
           </p:cNvPr>
@@ -7480,7 +7480,7 @@
           <p:cNvPr id="57" name="Content Placeholder 5" descr="A circuit board&#10;&#10;Description generated with very high confidence">
             <a:extLst>
               <a:ext uri="{FF2B5EF4-FFF2-40B4-BE49-F238E27FC236}">
-                <a16:creationId xmlns:a16="http://schemas.microsoft.com/office/drawing/2014/main" xmlns="" id="{ED9EF8B5-70F7-4E88-91C8-180B65BCDFE2}"/>
+                <a16:creationId xmlns="" xmlns:a16="http://schemas.microsoft.com/office/drawing/2014/main" id="{ED9EF8B5-70F7-4E88-91C8-180B65BCDFE2}"/>
               </a:ext>
             </a:extLst>
           </p:cNvPr>
@@ -7533,7 +7533,7 @@
           <p:cNvPr id="58" name="Content Placeholder 5" descr="A circuit board&#10;&#10;Description generated with very high confidence">
             <a:extLst>
               <a:ext uri="{FF2B5EF4-FFF2-40B4-BE49-F238E27FC236}">
-                <a16:creationId xmlns:a16="http://schemas.microsoft.com/office/drawing/2014/main" xmlns="" id="{9D5FE6FB-2B4A-4927-A8BD-8ACCDD0F523F}"/>
+                <a16:creationId xmlns="" xmlns:a16="http://schemas.microsoft.com/office/drawing/2014/main" id="{9D5FE6FB-2B4A-4927-A8BD-8ACCDD0F523F}"/>
               </a:ext>
             </a:extLst>
           </p:cNvPr>
@@ -7586,7 +7586,7 @@
           <p:cNvPr id="59" name="Straight Connector 58">
             <a:extLst>
               <a:ext uri="{FF2B5EF4-FFF2-40B4-BE49-F238E27FC236}">
-                <a16:creationId xmlns:a16="http://schemas.microsoft.com/office/drawing/2014/main" xmlns="" id="{2B19131D-C40D-4BF9-8F9B-67F09B103CBC}"/>
+                <a16:creationId xmlns="" xmlns:a16="http://schemas.microsoft.com/office/drawing/2014/main" id="{2B19131D-C40D-4BF9-8F9B-67F09B103CBC}"/>
               </a:ext>
             </a:extLst>
           </p:cNvPr>
@@ -7629,7 +7629,7 @@
           <p:cNvPr id="60" name="Rectangle 59">
             <a:extLst>
               <a:ext uri="{FF2B5EF4-FFF2-40B4-BE49-F238E27FC236}">
-                <a16:creationId xmlns:a16="http://schemas.microsoft.com/office/drawing/2014/main" xmlns="" id="{43B1B8C8-60F2-4BD6-A59F-6F6470F3D620}"/>
+                <a16:creationId xmlns="" xmlns:a16="http://schemas.microsoft.com/office/drawing/2014/main" id="{43B1B8C8-60F2-4BD6-A59F-6F6470F3D620}"/>
               </a:ext>
             </a:extLst>
           </p:cNvPr>
@@ -7669,7 +7669,7 @@
           <p:cNvPr id="61" name="Straight Connector 60">
             <a:extLst>
               <a:ext uri="{FF2B5EF4-FFF2-40B4-BE49-F238E27FC236}">
-                <a16:creationId xmlns:a16="http://schemas.microsoft.com/office/drawing/2014/main" xmlns="" id="{63F6A207-9705-484E-9D5D-E2FD81899E25}"/>
+                <a16:creationId xmlns="" xmlns:a16="http://schemas.microsoft.com/office/drawing/2014/main" id="{63F6A207-9705-484E-9D5D-E2FD81899E25}"/>
               </a:ext>
             </a:extLst>
           </p:cNvPr>
@@ -7712,7 +7712,7 @@
           <p:cNvPr id="62" name="Rectangle 61">
             <a:extLst>
               <a:ext uri="{FF2B5EF4-FFF2-40B4-BE49-F238E27FC236}">
-                <a16:creationId xmlns:a16="http://schemas.microsoft.com/office/drawing/2014/main" xmlns="" id="{48453D90-2C3C-4D9E-94A7-BA1C1B87C648}"/>
+                <a16:creationId xmlns="" xmlns:a16="http://schemas.microsoft.com/office/drawing/2014/main" id="{48453D90-2C3C-4D9E-94A7-BA1C1B87C648}"/>
               </a:ext>
             </a:extLst>
           </p:cNvPr>
@@ -7752,7 +7752,7 @@
           <p:cNvPr id="63" name="Straight Connector 62">
             <a:extLst>
               <a:ext uri="{FF2B5EF4-FFF2-40B4-BE49-F238E27FC236}">
-                <a16:creationId xmlns:a16="http://schemas.microsoft.com/office/drawing/2014/main" xmlns="" id="{C02DCEB8-DAD7-45C9-BB61-6A68795C11D3}"/>
+                <a16:creationId xmlns="" xmlns:a16="http://schemas.microsoft.com/office/drawing/2014/main" id="{C02DCEB8-DAD7-45C9-BB61-6A68795C11D3}"/>
               </a:ext>
             </a:extLst>
           </p:cNvPr>
@@ -7794,7 +7794,7 @@
           <p:cNvPr id="64" name="TextBox 63">
             <a:extLst>
               <a:ext uri="{FF2B5EF4-FFF2-40B4-BE49-F238E27FC236}">
-                <a16:creationId xmlns:a16="http://schemas.microsoft.com/office/drawing/2014/main" xmlns="" id="{D119A96B-8E57-4395-B729-1C9A8B768280}"/>
+                <a16:creationId xmlns="" xmlns:a16="http://schemas.microsoft.com/office/drawing/2014/main" id="{D119A96B-8E57-4395-B729-1C9A8B768280}"/>
               </a:ext>
             </a:extLst>
           </p:cNvPr>
@@ -7834,7 +7834,7 @@
           <p:cNvPr id="65" name="Straight Connector 64">
             <a:extLst>
               <a:ext uri="{FF2B5EF4-FFF2-40B4-BE49-F238E27FC236}">
-                <a16:creationId xmlns:a16="http://schemas.microsoft.com/office/drawing/2014/main" xmlns="" id="{2659EB35-A62B-475F-A0C7-FC1A82C66A82}"/>
+                <a16:creationId xmlns="" xmlns:a16="http://schemas.microsoft.com/office/drawing/2014/main" id="{2659EB35-A62B-475F-A0C7-FC1A82C66A82}"/>
               </a:ext>
             </a:extLst>
           </p:cNvPr>
@@ -7876,7 +7876,7 @@
           <p:cNvPr id="66" name="TextBox 65">
             <a:extLst>
               <a:ext uri="{FF2B5EF4-FFF2-40B4-BE49-F238E27FC236}">
-                <a16:creationId xmlns:a16="http://schemas.microsoft.com/office/drawing/2014/main" xmlns="" id="{FCA965D3-CEB6-4989-BD55-760938D2B00F}"/>
+                <a16:creationId xmlns="" xmlns:a16="http://schemas.microsoft.com/office/drawing/2014/main" id="{FCA965D3-CEB6-4989-BD55-760938D2B00F}"/>
               </a:ext>
             </a:extLst>
           </p:cNvPr>
@@ -7916,7 +7916,7 @@
           <p:cNvPr id="14" name="Picture 13" descr="A circuit board&#10;&#10;Description generated with very high confidence">
             <a:extLst>
               <a:ext uri="{FF2B5EF4-FFF2-40B4-BE49-F238E27FC236}">
-                <a16:creationId xmlns:a16="http://schemas.microsoft.com/office/drawing/2014/main" xmlns="" id="{F02E6873-3F41-4789-BA14-4E4FD8AF0C9A}"/>
+                <a16:creationId xmlns="" xmlns:a16="http://schemas.microsoft.com/office/drawing/2014/main" id="{F02E6873-3F41-4789-BA14-4E4FD8AF0C9A}"/>
               </a:ext>
             </a:extLst>
           </p:cNvPr>
@@ -7995,7 +7995,7 @@
           <p:cNvPr id="15" name="Rectangle 14">
             <a:extLst>
               <a:ext uri="{FF2B5EF4-FFF2-40B4-BE49-F238E27FC236}">
-                <a16:creationId xmlns:a16="http://schemas.microsoft.com/office/drawing/2014/main" xmlns="" id="{4B580BE5-3544-4D96-8808-16A5155361D9}"/>
+                <a16:creationId xmlns="" xmlns:a16="http://schemas.microsoft.com/office/drawing/2014/main" id="{4B580BE5-3544-4D96-8808-16A5155361D9}"/>
               </a:ext>
             </a:extLst>
           </p:cNvPr>
@@ -8176,7 +8176,7 @@
           <p:cNvPr id="3" name="Content Placeholder 2">
             <a:extLst>
               <a:ext uri="{FF2B5EF4-FFF2-40B4-BE49-F238E27FC236}">
-                <a16:creationId xmlns:a16="http://schemas.microsoft.com/office/drawing/2014/main" xmlns="" id="{33BDBA3D-7777-45B6-8177-21D7F6221900}"/>
+                <a16:creationId xmlns="" xmlns:a16="http://schemas.microsoft.com/office/drawing/2014/main" id="{33BDBA3D-7777-45B6-8177-21D7F6221900}"/>
               </a:ext>
             </a:extLst>
           </p:cNvPr>
@@ -8295,11 +8295,7 @@
           <a:p>
             <a:r>
               <a:rPr lang="nl-NL" dirty="0" smtClean="0"/>
-              <a:t>Huidige</a:t>
-            </a:r>
-            <a:r>
-              <a:rPr lang="nl-NL" dirty="0" smtClean="0"/>
-              <a:t> </a:t>
+              <a:t>Huidige </a:t>
             </a:r>
             <a:r>
               <a:rPr lang="nl-NL" dirty="0"/>
@@ -8528,7 +8524,7 @@
           <p:cNvPr id="2" name="Titel 1">
             <a:extLst>
               <a:ext uri="{FF2B5EF4-FFF2-40B4-BE49-F238E27FC236}">
-                <a16:creationId xmlns:a16="http://schemas.microsoft.com/office/drawing/2014/main" xmlns="" id="{8D734D26-F9B2-3541-B32E-538B06BA29FC}"/>
+                <a16:creationId xmlns="" xmlns:a16="http://schemas.microsoft.com/office/drawing/2014/main" id="{8D734D26-F9B2-3541-B32E-538B06BA29FC}"/>
               </a:ext>
             </a:extLst>
           </p:cNvPr>
@@ -8554,38 +8550,10 @@
       </p:sp>
       <p:sp>
         <p:nvSpPr>
-          <p:cNvPr id="3" name="Tijdelijke aanduiding voor inhoud 2">
+          <p:cNvPr id="4" name="Tijdelijke aanduiding voor dianummer 3">
             <a:extLst>
               <a:ext uri="{FF2B5EF4-FFF2-40B4-BE49-F238E27FC236}">
-                <a16:creationId xmlns:a16="http://schemas.microsoft.com/office/drawing/2014/main" xmlns="" id="{CF2996FC-E90D-5E46-A05B-9A98CDEA281E}"/>
-              </a:ext>
-            </a:extLst>
-          </p:cNvPr>
-          <p:cNvSpPr>
-            <a:spLocks noGrp="1"/>
-          </p:cNvSpPr>
-          <p:nvPr>
-            <p:ph idx="1"/>
-          </p:nvPr>
-        </p:nvSpPr>
-        <p:spPr/>
-        <p:txBody>
-          <a:bodyPr/>
-          <a:lstStyle/>
-          <a:p>
-            <a:pPr marL="85725" indent="0">
-              <a:buNone/>
-            </a:pPr>
-            <a:endParaRPr lang="nl-BE" dirty="0"/>
-          </a:p>
-        </p:txBody>
-      </p:sp>
-      <p:sp>
-        <p:nvSpPr>
-          <p:cNvPr id="4" name="Tijdelijke aanduiding voor dianummer 3">
-            <a:extLst>
-              <a:ext uri="{FF2B5EF4-FFF2-40B4-BE49-F238E27FC236}">
-                <a16:creationId xmlns:a16="http://schemas.microsoft.com/office/drawing/2014/main" xmlns="" id="{0EA116A7-5556-A949-946A-85F835158AB1}"/>
+                <a16:creationId xmlns="" xmlns:a16="http://schemas.microsoft.com/office/drawing/2014/main" id="{0EA116A7-5556-A949-946A-85F835158AB1}"/>
               </a:ext>
             </a:extLst>
           </p:cNvPr>
@@ -8611,19 +8579,13 @@
       </p:sp>
       <p:pic>
         <p:nvPicPr>
-          <p:cNvPr id="5" name="Picture 9" descr="A close up of a logo&#10;&#10;Description generated with high confidence">
-            <a:extLst>
-              <a:ext uri="{FF2B5EF4-FFF2-40B4-BE49-F238E27FC236}">
-                <a16:creationId xmlns:a16="http://schemas.microsoft.com/office/drawing/2014/main" xmlns="" id="{67F08306-C204-6048-B148-5DAED9ED9343}"/>
-              </a:ext>
-            </a:extLst>
-          </p:cNvPr>
+          <p:cNvPr id="1026" name="Picture 2" descr="Image result for unity logo"/>
           <p:cNvPicPr>
-            <a:picLocks noChangeAspect="1"/>
+            <a:picLocks noChangeAspect="1" noChangeArrowheads="1"/>
           </p:cNvPicPr>
           <p:nvPr/>
         </p:nvPicPr>
-        <p:blipFill>
+        <p:blipFill rotWithShape="1">
           <a:blip r:embed="rId3" cstate="print">
             <a:extLst>
               <a:ext uri="{28A0092B-C50C-407E-A947-70E740481C1C}">
@@ -8631,18 +8593,27 @@
               </a:ext>
             </a:extLst>
           </a:blip>
-          <a:stretch>
-            <a:fillRect/>
-          </a:stretch>
+          <a:srcRect l="20607" t="27933" r="19297" b="29415"/>
+          <a:stretch/>
         </p:blipFill>
-        <p:spPr>
+        <p:spPr bwMode="auto">
           <a:xfrm>
-            <a:off x="2701846" y="8565823"/>
-            <a:ext cx="2809160" cy="991638"/>
+            <a:off x="2844800" y="8229600"/>
+            <a:ext cx="2768600" cy="1104900"/>
           </a:xfrm>
           <a:prstGeom prst="rect">
             <a:avLst/>
           </a:prstGeom>
+          <a:noFill/>
+          <a:extLst>
+            <a:ext uri="{909E8E84-426E-40DD-AFC4-6F175D3DCCD1}">
+              <a14:hiddenFill xmlns:a14="http://schemas.microsoft.com/office/drawing/2010/main">
+                <a:solidFill>
+                  <a:srgbClr val="FFFFFF"/>
+                </a:solidFill>
+              </a14:hiddenFill>
+            </a:ext>
+          </a:extLst>
         </p:spPr>
       </p:pic>
     </p:spTree>
@@ -8809,7 +8780,7 @@
           <p:cNvPr id="3" name="Text Placeholder 2">
             <a:extLst>
               <a:ext uri="{FF2B5EF4-FFF2-40B4-BE49-F238E27FC236}">
-                <a16:creationId xmlns:a16="http://schemas.microsoft.com/office/drawing/2014/main" xmlns="" id="{92477C20-CD3E-4D2F-AF22-4E23F6624F5E}"/>
+                <a16:creationId xmlns="" xmlns:a16="http://schemas.microsoft.com/office/drawing/2014/main" id="{92477C20-CD3E-4D2F-AF22-4E23F6624F5E}"/>
               </a:ext>
             </a:extLst>
           </p:cNvPr>
@@ -8986,7 +8957,7 @@
           <p:cNvPr id="10" name="Content Placeholder 9" descr="A large room&#10;&#10;Description generated with high confidence">
             <a:extLst>
               <a:ext uri="{FF2B5EF4-FFF2-40B4-BE49-F238E27FC236}">
-                <a16:creationId xmlns:a16="http://schemas.microsoft.com/office/drawing/2014/main" xmlns="" id="{CB18B540-A7A0-45B7-B302-B92E6367E279}"/>
+                <a16:creationId xmlns="" xmlns:a16="http://schemas.microsoft.com/office/drawing/2014/main" id="{CB18B540-A7A0-45B7-B302-B92E6367E279}"/>
               </a:ext>
             </a:extLst>
           </p:cNvPr>
@@ -9172,7 +9143,7 @@
           <p:cNvPr id="5" name="Content Placeholder 5" descr="A picture containing black, cat, rowel&#10;&#10;Description generated with very high confidence">
             <a:extLst>
               <a:ext uri="{FF2B5EF4-FFF2-40B4-BE49-F238E27FC236}">
-                <a16:creationId xmlns:a16="http://schemas.microsoft.com/office/drawing/2014/main" xmlns="" id="{209815B5-D362-4E21-B105-90FB0738077B}"/>
+                <a16:creationId xmlns="" xmlns:a16="http://schemas.microsoft.com/office/drawing/2014/main" id="{209815B5-D362-4E21-B105-90FB0738077B}"/>
               </a:ext>
             </a:extLst>
           </p:cNvPr>
@@ -9217,7 +9188,7 @@
           <p:cNvPr id="6" name="Content Placeholder 5" descr="A circuit board&#10;&#10;Description generated with very high confidence">
             <a:extLst>
               <a:ext uri="{FF2B5EF4-FFF2-40B4-BE49-F238E27FC236}">
-                <a16:creationId xmlns:a16="http://schemas.microsoft.com/office/drawing/2014/main" xmlns="" id="{5DC46D9F-5DB3-407F-B27A-199B3FE0352B}"/>
+                <a16:creationId xmlns="" xmlns:a16="http://schemas.microsoft.com/office/drawing/2014/main" id="{5DC46D9F-5DB3-407F-B27A-199B3FE0352B}"/>
               </a:ext>
             </a:extLst>
           </p:cNvPr>
@@ -9263,7 +9234,7 @@
           <p:cNvPr id="18" name="Picture 17" descr="A close up of a computer&#10;&#10;Description generated with very high confidence">
             <a:extLst>
               <a:ext uri="{FF2B5EF4-FFF2-40B4-BE49-F238E27FC236}">
-                <a16:creationId xmlns:a16="http://schemas.microsoft.com/office/drawing/2014/main" xmlns="" id="{E9750424-21F3-4252-B2D0-92619F4A0BAD}"/>
+                <a16:creationId xmlns="" xmlns:a16="http://schemas.microsoft.com/office/drawing/2014/main" id="{E9750424-21F3-4252-B2D0-92619F4A0BAD}"/>
               </a:ext>
             </a:extLst>
           </p:cNvPr>
@@ -9329,7 +9300,7 @@
           <p:cNvPr id="7" name="Straight Connector 6">
             <a:extLst>
               <a:ext uri="{FF2B5EF4-FFF2-40B4-BE49-F238E27FC236}">
-                <a16:creationId xmlns:a16="http://schemas.microsoft.com/office/drawing/2014/main" xmlns="" id="{7C022078-64FB-4E01-B5F9-72AEBF028F24}"/>
+                <a16:creationId xmlns="" xmlns:a16="http://schemas.microsoft.com/office/drawing/2014/main" id="{7C022078-64FB-4E01-B5F9-72AEBF028F24}"/>
               </a:ext>
             </a:extLst>
           </p:cNvPr>
@@ -9373,7 +9344,7 @@
           <p:cNvPr id="24" name="Straight Connector 23">
             <a:extLst>
               <a:ext uri="{FF2B5EF4-FFF2-40B4-BE49-F238E27FC236}">
-                <a16:creationId xmlns:a16="http://schemas.microsoft.com/office/drawing/2014/main" xmlns="" id="{A5ACC2CB-29EE-4B2E-8F9B-C4140FEBE798}"/>
+                <a16:creationId xmlns="" xmlns:a16="http://schemas.microsoft.com/office/drawing/2014/main" id="{A5ACC2CB-29EE-4B2E-8F9B-C4140FEBE798}"/>
               </a:ext>
             </a:extLst>
           </p:cNvPr>
@@ -9418,7 +9389,7 @@
           <p:cNvPr id="25" name="Straight Connector 24">
             <a:extLst>
               <a:ext uri="{FF2B5EF4-FFF2-40B4-BE49-F238E27FC236}">
-                <a16:creationId xmlns:a16="http://schemas.microsoft.com/office/drawing/2014/main" xmlns="" id="{DD833622-E1CB-4406-BC3B-BEC0EA9F358B}"/>
+                <a16:creationId xmlns="" xmlns:a16="http://schemas.microsoft.com/office/drawing/2014/main" id="{DD833622-E1CB-4406-BC3B-BEC0EA9F358B}"/>
               </a:ext>
             </a:extLst>
           </p:cNvPr>
@@ -9463,7 +9434,7 @@
           <p:cNvPr id="31" name="Straight Connector 30">
             <a:extLst>
               <a:ext uri="{FF2B5EF4-FFF2-40B4-BE49-F238E27FC236}">
-                <a16:creationId xmlns:a16="http://schemas.microsoft.com/office/drawing/2014/main" xmlns="" id="{42965CAB-4FC4-44FC-974F-2A001BFFDAC2}"/>
+                <a16:creationId xmlns="" xmlns:a16="http://schemas.microsoft.com/office/drawing/2014/main" id="{42965CAB-4FC4-44FC-974F-2A001BFFDAC2}"/>
               </a:ext>
             </a:extLst>
           </p:cNvPr>
@@ -9506,7 +9477,7 @@
           <p:cNvPr id="32" name="Straight Connector 31">
             <a:extLst>
               <a:ext uri="{FF2B5EF4-FFF2-40B4-BE49-F238E27FC236}">
-                <a16:creationId xmlns:a16="http://schemas.microsoft.com/office/drawing/2014/main" xmlns="" id="{6A385D8E-99CA-4AC3-915F-B7588F75E6E6}"/>
+                <a16:creationId xmlns="" xmlns:a16="http://schemas.microsoft.com/office/drawing/2014/main" id="{6A385D8E-99CA-4AC3-915F-B7588F75E6E6}"/>
               </a:ext>
             </a:extLst>
           </p:cNvPr>
@@ -9548,7 +9519,7 @@
           <p:cNvPr id="36" name="Content Placeholder 8" descr="A close up of a device&#10;&#10;Description generated with high confidence">
             <a:extLst>
               <a:ext uri="{FF2B5EF4-FFF2-40B4-BE49-F238E27FC236}">
-                <a16:creationId xmlns:a16="http://schemas.microsoft.com/office/drawing/2014/main" xmlns="" id="{4DCA515B-FF18-4773-879C-D0DA14287EA4}"/>
+                <a16:creationId xmlns="" xmlns:a16="http://schemas.microsoft.com/office/drawing/2014/main" id="{4DCA515B-FF18-4773-879C-D0DA14287EA4}"/>
               </a:ext>
             </a:extLst>
           </p:cNvPr>
@@ -9593,7 +9564,7 @@
           <p:cNvPr id="37" name="Straight Connector 36">
             <a:extLst>
               <a:ext uri="{FF2B5EF4-FFF2-40B4-BE49-F238E27FC236}">
-                <a16:creationId xmlns:a16="http://schemas.microsoft.com/office/drawing/2014/main" xmlns="" id="{7A9CC6C6-26AC-4C9B-963B-9C13D9697B44}"/>
+                <a16:creationId xmlns="" xmlns:a16="http://schemas.microsoft.com/office/drawing/2014/main" id="{7A9CC6C6-26AC-4C9B-963B-9C13D9697B44}"/>
               </a:ext>
             </a:extLst>
           </p:cNvPr>
@@ -9635,7 +9606,7 @@
           <p:cNvPr id="33" name="Content Placeholder 5" descr="A circuit board&#10;&#10;Description generated with very high confidence">
             <a:extLst>
               <a:ext uri="{FF2B5EF4-FFF2-40B4-BE49-F238E27FC236}">
-                <a16:creationId xmlns:a16="http://schemas.microsoft.com/office/drawing/2014/main" xmlns="" id="{5E97ED60-7D5C-412E-BD73-CA59674ADA15}"/>
+                <a16:creationId xmlns="" xmlns:a16="http://schemas.microsoft.com/office/drawing/2014/main" id="{5E97ED60-7D5C-412E-BD73-CA59674ADA15}"/>
               </a:ext>
             </a:extLst>
           </p:cNvPr>
@@ -9689,7 +9660,7 @@
           <p:cNvPr id="40" name="Straight Connector 39">
             <a:extLst>
               <a:ext uri="{FF2B5EF4-FFF2-40B4-BE49-F238E27FC236}">
-                <a16:creationId xmlns:a16="http://schemas.microsoft.com/office/drawing/2014/main" xmlns="" id="{3502DCF6-F5E2-4DE3-9B56-35798FF187D8}"/>
+                <a16:creationId xmlns="" xmlns:a16="http://schemas.microsoft.com/office/drawing/2014/main" id="{3502DCF6-F5E2-4DE3-9B56-35798FF187D8}"/>
               </a:ext>
             </a:extLst>
           </p:cNvPr>
@@ -9734,7 +9705,7 @@
           <p:cNvPr id="41" name="Straight Connector 40">
             <a:extLst>
               <a:ext uri="{FF2B5EF4-FFF2-40B4-BE49-F238E27FC236}">
-                <a16:creationId xmlns:a16="http://schemas.microsoft.com/office/drawing/2014/main" xmlns="" id="{646C3ECD-1E1B-4EA5-888B-0E5F68D9A070}"/>
+                <a16:creationId xmlns="" xmlns:a16="http://schemas.microsoft.com/office/drawing/2014/main" id="{646C3ECD-1E1B-4EA5-888B-0E5F68D9A070}"/>
               </a:ext>
             </a:extLst>
           </p:cNvPr>
@@ -9776,7 +9747,7 @@
           <p:cNvPr id="21" name="Content Placeholder 5" descr="A circuit board&#10;&#10;Description generated with very high confidence">
             <a:extLst>
               <a:ext uri="{FF2B5EF4-FFF2-40B4-BE49-F238E27FC236}">
-                <a16:creationId xmlns:a16="http://schemas.microsoft.com/office/drawing/2014/main" xmlns="" id="{6D79CF16-C9A0-4673-AA2E-348378FF8194}"/>
+                <a16:creationId xmlns="" xmlns:a16="http://schemas.microsoft.com/office/drawing/2014/main" id="{6D79CF16-C9A0-4673-AA2E-348378FF8194}"/>
               </a:ext>
             </a:extLst>
           </p:cNvPr>
@@ -9830,7 +9801,7 @@
           <p:cNvPr id="20" name="Content Placeholder 5" descr="A circuit board&#10;&#10;Description generated with very high confidence">
             <a:extLst>
               <a:ext uri="{FF2B5EF4-FFF2-40B4-BE49-F238E27FC236}">
-                <a16:creationId xmlns:a16="http://schemas.microsoft.com/office/drawing/2014/main" xmlns="" id="{8DE2BD19-D59F-4A31-92EF-1B0D9E9D0FDB}"/>
+                <a16:creationId xmlns="" xmlns:a16="http://schemas.microsoft.com/office/drawing/2014/main" id="{8DE2BD19-D59F-4A31-92EF-1B0D9E9D0FDB}"/>
               </a:ext>
             </a:extLst>
           </p:cNvPr>
@@ -9884,7 +9855,7 @@
           <p:cNvPr id="22" name="Content Placeholder 5" descr="A circuit board&#10;&#10;Description generated with very high confidence">
             <a:extLst>
               <a:ext uri="{FF2B5EF4-FFF2-40B4-BE49-F238E27FC236}">
-                <a16:creationId xmlns:a16="http://schemas.microsoft.com/office/drawing/2014/main" xmlns="" id="{ADF143CE-9778-400F-8F41-742E440E5FBF}"/>
+                <a16:creationId xmlns="" xmlns:a16="http://schemas.microsoft.com/office/drawing/2014/main" id="{ADF143CE-9778-400F-8F41-742E440E5FBF}"/>
               </a:ext>
             </a:extLst>
           </p:cNvPr>
@@ -9968,7 +9939,7 @@
           <p:cNvPr id="2" name="Titel 1">
             <a:extLst>
               <a:ext uri="{FF2B5EF4-FFF2-40B4-BE49-F238E27FC236}">
-                <a16:creationId xmlns:a16="http://schemas.microsoft.com/office/drawing/2014/main" xmlns="" id="{1FFAB8F2-0498-A641-BB29-3AA457B69D7B}"/>
+                <a16:creationId xmlns="" xmlns:a16="http://schemas.microsoft.com/office/drawing/2014/main" id="{1FFAB8F2-0498-A641-BB29-3AA457B69D7B}"/>
               </a:ext>
             </a:extLst>
           </p:cNvPr>
@@ -9996,7 +9967,7 @@
           <p:cNvPr id="6" name="Tijdelijke aanduiding voor inhoud 5">
             <a:extLst>
               <a:ext uri="{FF2B5EF4-FFF2-40B4-BE49-F238E27FC236}">
-                <a16:creationId xmlns:a16="http://schemas.microsoft.com/office/drawing/2014/main" xmlns="" id="{733B7EA9-5F7D-1A48-948A-B5BE09409125}"/>
+                <a16:creationId xmlns="" xmlns:a16="http://schemas.microsoft.com/office/drawing/2014/main" id="{733B7EA9-5F7D-1A48-948A-B5BE09409125}"/>
               </a:ext>
             </a:extLst>
           </p:cNvPr>
@@ -10031,7 +10002,7 @@
           <p:cNvPr id="4" name="Tijdelijke aanduiding voor dianummer 3">
             <a:extLst>
               <a:ext uri="{FF2B5EF4-FFF2-40B4-BE49-F238E27FC236}">
-                <a16:creationId xmlns:a16="http://schemas.microsoft.com/office/drawing/2014/main" xmlns="" id="{2C6F5415-09FB-E246-85FC-9FFA6DA13304}"/>
+                <a16:creationId xmlns="" xmlns:a16="http://schemas.microsoft.com/office/drawing/2014/main" id="{2C6F5415-09FB-E246-85FC-9FFA6DA13304}"/>
               </a:ext>
             </a:extLst>
           </p:cNvPr>
@@ -10060,7 +10031,7 @@
           <p:cNvPr id="8" name="Afbeelding 7">
             <a:extLst>
               <a:ext uri="{FF2B5EF4-FFF2-40B4-BE49-F238E27FC236}">
-                <a16:creationId xmlns:a16="http://schemas.microsoft.com/office/drawing/2014/main" xmlns="" id="{E35B8C32-6AEC-B547-80F6-2FFB096A58CE}"/>
+                <a16:creationId xmlns="" xmlns:a16="http://schemas.microsoft.com/office/drawing/2014/main" id="{E35B8C32-6AEC-B547-80F6-2FFB096A58CE}"/>
               </a:ext>
             </a:extLst>
           </p:cNvPr>
@@ -10096,7 +10067,7 @@
           <p:cNvPr id="10" name="Afbeelding 9">
             <a:extLst>
               <a:ext uri="{FF2B5EF4-FFF2-40B4-BE49-F238E27FC236}">
-                <a16:creationId xmlns:a16="http://schemas.microsoft.com/office/drawing/2014/main" xmlns="" id="{C21EFF53-6811-1540-83AC-6426297A79BB}"/>
+                <a16:creationId xmlns="" xmlns:a16="http://schemas.microsoft.com/office/drawing/2014/main" id="{C21EFF53-6811-1540-83AC-6426297A79BB}"/>
               </a:ext>
             </a:extLst>
           </p:cNvPr>
@@ -10133,7 +10104,7 @@
           <p:cNvPr id="13" name="Tekstvak 12">
             <a:extLst>
               <a:ext uri="{FF2B5EF4-FFF2-40B4-BE49-F238E27FC236}">
-                <a16:creationId xmlns:a16="http://schemas.microsoft.com/office/drawing/2014/main" xmlns="" id="{554F8DF2-5EAE-244B-9990-CA9BF17D205A}"/>
+                <a16:creationId xmlns="" xmlns:a16="http://schemas.microsoft.com/office/drawing/2014/main" id="{554F8DF2-5EAE-244B-9990-CA9BF17D205A}"/>
               </a:ext>
             </a:extLst>
           </p:cNvPr>
@@ -10173,7 +10144,7 @@
           <p:cNvPr id="14" name="Tekstvak 13">
             <a:extLst>
               <a:ext uri="{FF2B5EF4-FFF2-40B4-BE49-F238E27FC236}">
-                <a16:creationId xmlns:a16="http://schemas.microsoft.com/office/drawing/2014/main" xmlns="" id="{6DC4DF71-A40D-A14F-8206-17B2F697B3D4}"/>
+                <a16:creationId xmlns="" xmlns:a16="http://schemas.microsoft.com/office/drawing/2014/main" id="{6DC4DF71-A40D-A14F-8206-17B2F697B3D4}"/>
               </a:ext>
             </a:extLst>
           </p:cNvPr>
@@ -10213,7 +10184,7 @@
           <p:cNvPr id="15" name="Tekstvak 14">
             <a:extLst>
               <a:ext uri="{FF2B5EF4-FFF2-40B4-BE49-F238E27FC236}">
-                <a16:creationId xmlns:a16="http://schemas.microsoft.com/office/drawing/2014/main" xmlns="" id="{238F07D3-3D8F-9A46-95C2-613F419AE752}"/>
+                <a16:creationId xmlns="" xmlns:a16="http://schemas.microsoft.com/office/drawing/2014/main" id="{238F07D3-3D8F-9A46-95C2-613F419AE752}"/>
               </a:ext>
             </a:extLst>
           </p:cNvPr>
@@ -10253,7 +10224,7 @@
           <p:cNvPr id="16" name="Tekstvak 15">
             <a:extLst>
               <a:ext uri="{FF2B5EF4-FFF2-40B4-BE49-F238E27FC236}">
-                <a16:creationId xmlns:a16="http://schemas.microsoft.com/office/drawing/2014/main" xmlns="" id="{EDA92F2B-4851-2046-8504-CBD93DD34229}"/>
+                <a16:creationId xmlns="" xmlns:a16="http://schemas.microsoft.com/office/drawing/2014/main" id="{EDA92F2B-4851-2046-8504-CBD93DD34229}"/>
               </a:ext>
             </a:extLst>
           </p:cNvPr>
@@ -10324,7 +10295,7 @@
           <p:cNvPr id="2" name="Titel 1">
             <a:extLst>
               <a:ext uri="{FF2B5EF4-FFF2-40B4-BE49-F238E27FC236}">
-                <a16:creationId xmlns:a16="http://schemas.microsoft.com/office/drawing/2014/main" xmlns="" id="{8D734D26-F9B2-3541-B32E-538B06BA29FC}"/>
+                <a16:creationId xmlns="" xmlns:a16="http://schemas.microsoft.com/office/drawing/2014/main" id="{8D734D26-F9B2-3541-B32E-538B06BA29FC}"/>
               </a:ext>
             </a:extLst>
           </p:cNvPr>
@@ -10352,7 +10323,7 @@
           <p:cNvPr id="3" name="Tijdelijke aanduiding voor inhoud 2">
             <a:extLst>
               <a:ext uri="{FF2B5EF4-FFF2-40B4-BE49-F238E27FC236}">
-                <a16:creationId xmlns:a16="http://schemas.microsoft.com/office/drawing/2014/main" xmlns="" id="{CF2996FC-E90D-5E46-A05B-9A98CDEA281E}"/>
+                <a16:creationId xmlns="" xmlns:a16="http://schemas.microsoft.com/office/drawing/2014/main" id="{CF2996FC-E90D-5E46-A05B-9A98CDEA281E}"/>
               </a:ext>
             </a:extLst>
           </p:cNvPr>
@@ -10386,7 +10357,7 @@
           <p:cNvPr id="4" name="Tijdelijke aanduiding voor dianummer 3">
             <a:extLst>
               <a:ext uri="{FF2B5EF4-FFF2-40B4-BE49-F238E27FC236}">
-                <a16:creationId xmlns:a16="http://schemas.microsoft.com/office/drawing/2014/main" xmlns="" id="{0EA116A7-5556-A949-946A-85F835158AB1}"/>
+                <a16:creationId xmlns="" xmlns:a16="http://schemas.microsoft.com/office/drawing/2014/main" id="{0EA116A7-5556-A949-946A-85F835158AB1}"/>
               </a:ext>
             </a:extLst>
           </p:cNvPr>
@@ -10415,7 +10386,7 @@
           <p:cNvPr id="5" name="Picture 9" descr="A close up of a logo&#10;&#10;Description generated with high confidence">
             <a:extLst>
               <a:ext uri="{FF2B5EF4-FFF2-40B4-BE49-F238E27FC236}">
-                <a16:creationId xmlns:a16="http://schemas.microsoft.com/office/drawing/2014/main" xmlns="" id="{67F08306-C204-6048-B148-5DAED9ED9343}"/>
+                <a16:creationId xmlns="" xmlns:a16="http://schemas.microsoft.com/office/drawing/2014/main" id="{67F08306-C204-6048-B148-5DAED9ED9343}"/>
               </a:ext>
             </a:extLst>
           </p:cNvPr>
@@ -10451,7 +10422,7 @@
           <p:cNvPr id="6" name="Picture 7" descr="A picture containing clipart&#10;&#10;Description generated with very high confidence">
             <a:extLst>
               <a:ext uri="{FF2B5EF4-FFF2-40B4-BE49-F238E27FC236}">
-                <a16:creationId xmlns:a16="http://schemas.microsoft.com/office/drawing/2014/main" xmlns="" id="{8B607C42-22A3-4B47-957B-148034FB9485}"/>
+                <a16:creationId xmlns="" xmlns:a16="http://schemas.microsoft.com/office/drawing/2014/main" id="{8B607C42-22A3-4B47-957B-148034FB9485}"/>
               </a:ext>
             </a:extLst>
           </p:cNvPr>
@@ -10487,7 +10458,7 @@
           <p:cNvPr id="7" name="Content Placeholder 5" descr="A circuit board&#10;&#10;Description generated with very high confidence">
             <a:extLst>
               <a:ext uri="{FF2B5EF4-FFF2-40B4-BE49-F238E27FC236}">
-                <a16:creationId xmlns:a16="http://schemas.microsoft.com/office/drawing/2014/main" xmlns="" id="{5CE4F5B8-1B23-2744-98D1-8B1A5AD80EBB}"/>
+                <a16:creationId xmlns="" xmlns:a16="http://schemas.microsoft.com/office/drawing/2014/main" id="{5CE4F5B8-1B23-2744-98D1-8B1A5AD80EBB}"/>
               </a:ext>
             </a:extLst>
           </p:cNvPr>
@@ -10541,7 +10512,7 @@
           <p:cNvPr id="8" name="Content Placeholder 17" descr="A circuit board&#10;&#10;Description generated with very high confidence">
             <a:extLst>
               <a:ext uri="{FF2B5EF4-FFF2-40B4-BE49-F238E27FC236}">
-                <a16:creationId xmlns:a16="http://schemas.microsoft.com/office/drawing/2014/main" xmlns="" id="{CDBBCEFF-A670-2443-BCCC-40DCBE5ED0CE}"/>
+                <a16:creationId xmlns="" xmlns:a16="http://schemas.microsoft.com/office/drawing/2014/main" id="{CDBBCEFF-A670-2443-BCCC-40DCBE5ED0CE}"/>
               </a:ext>
             </a:extLst>
           </p:cNvPr>
@@ -10679,7 +10650,7 @@
           <p:cNvPr id="5" name="Content Placeholder 5" descr="A picture containing black, cat, rowel&#10;&#10;Description generated with very high confidence">
             <a:extLst>
               <a:ext uri="{FF2B5EF4-FFF2-40B4-BE49-F238E27FC236}">
-                <a16:creationId xmlns:a16="http://schemas.microsoft.com/office/drawing/2014/main" xmlns="" id="{209815B5-D362-4E21-B105-90FB0738077B}"/>
+                <a16:creationId xmlns="" xmlns:a16="http://schemas.microsoft.com/office/drawing/2014/main" id="{209815B5-D362-4E21-B105-90FB0738077B}"/>
               </a:ext>
             </a:extLst>
           </p:cNvPr>
@@ -10724,7 +10695,7 @@
           <p:cNvPr id="6" name="Content Placeholder 5" descr="A circuit board&#10;&#10;Description generated with very high confidence">
             <a:extLst>
               <a:ext uri="{FF2B5EF4-FFF2-40B4-BE49-F238E27FC236}">
-                <a16:creationId xmlns:a16="http://schemas.microsoft.com/office/drawing/2014/main" xmlns="" id="{5DC46D9F-5DB3-407F-B27A-199B3FE0352B}"/>
+                <a16:creationId xmlns="" xmlns:a16="http://schemas.microsoft.com/office/drawing/2014/main" id="{5DC46D9F-5DB3-407F-B27A-199B3FE0352B}"/>
               </a:ext>
             </a:extLst>
           </p:cNvPr>
@@ -10770,7 +10741,7 @@
           <p:cNvPr id="18" name="Picture 17" descr="A close up of a computer&#10;&#10;Description generated with very high confidence">
             <a:extLst>
               <a:ext uri="{FF2B5EF4-FFF2-40B4-BE49-F238E27FC236}">
-                <a16:creationId xmlns:a16="http://schemas.microsoft.com/office/drawing/2014/main" xmlns="" id="{E9750424-21F3-4252-B2D0-92619F4A0BAD}"/>
+                <a16:creationId xmlns="" xmlns:a16="http://schemas.microsoft.com/office/drawing/2014/main" id="{E9750424-21F3-4252-B2D0-92619F4A0BAD}"/>
               </a:ext>
             </a:extLst>
           </p:cNvPr>
@@ -10836,7 +10807,7 @@
           <p:cNvPr id="7" name="Straight Connector 6">
             <a:extLst>
               <a:ext uri="{FF2B5EF4-FFF2-40B4-BE49-F238E27FC236}">
-                <a16:creationId xmlns:a16="http://schemas.microsoft.com/office/drawing/2014/main" xmlns="" id="{7C022078-64FB-4E01-B5F9-72AEBF028F24}"/>
+                <a16:creationId xmlns="" xmlns:a16="http://schemas.microsoft.com/office/drawing/2014/main" id="{7C022078-64FB-4E01-B5F9-72AEBF028F24}"/>
               </a:ext>
             </a:extLst>
           </p:cNvPr>
@@ -10880,7 +10851,7 @@
           <p:cNvPr id="24" name="Straight Connector 23">
             <a:extLst>
               <a:ext uri="{FF2B5EF4-FFF2-40B4-BE49-F238E27FC236}">
-                <a16:creationId xmlns:a16="http://schemas.microsoft.com/office/drawing/2014/main" xmlns="" id="{A5ACC2CB-29EE-4B2E-8F9B-C4140FEBE798}"/>
+                <a16:creationId xmlns="" xmlns:a16="http://schemas.microsoft.com/office/drawing/2014/main" id="{A5ACC2CB-29EE-4B2E-8F9B-C4140FEBE798}"/>
               </a:ext>
             </a:extLst>
           </p:cNvPr>
@@ -10925,7 +10896,7 @@
           <p:cNvPr id="25" name="Straight Connector 24">
             <a:extLst>
               <a:ext uri="{FF2B5EF4-FFF2-40B4-BE49-F238E27FC236}">
-                <a16:creationId xmlns:a16="http://schemas.microsoft.com/office/drawing/2014/main" xmlns="" id="{DD833622-E1CB-4406-BC3B-BEC0EA9F358B}"/>
+                <a16:creationId xmlns="" xmlns:a16="http://schemas.microsoft.com/office/drawing/2014/main" id="{DD833622-E1CB-4406-BC3B-BEC0EA9F358B}"/>
               </a:ext>
             </a:extLst>
           </p:cNvPr>
@@ -10970,7 +10941,7 @@
           <p:cNvPr id="31" name="Straight Connector 30">
             <a:extLst>
               <a:ext uri="{FF2B5EF4-FFF2-40B4-BE49-F238E27FC236}">
-                <a16:creationId xmlns:a16="http://schemas.microsoft.com/office/drawing/2014/main" xmlns="" id="{42965CAB-4FC4-44FC-974F-2A001BFFDAC2}"/>
+                <a16:creationId xmlns="" xmlns:a16="http://schemas.microsoft.com/office/drawing/2014/main" id="{42965CAB-4FC4-44FC-974F-2A001BFFDAC2}"/>
               </a:ext>
             </a:extLst>
           </p:cNvPr>
@@ -11013,7 +10984,7 @@
           <p:cNvPr id="32" name="Straight Connector 31">
             <a:extLst>
               <a:ext uri="{FF2B5EF4-FFF2-40B4-BE49-F238E27FC236}">
-                <a16:creationId xmlns:a16="http://schemas.microsoft.com/office/drawing/2014/main" xmlns="" id="{6A385D8E-99CA-4AC3-915F-B7588F75E6E6}"/>
+                <a16:creationId xmlns="" xmlns:a16="http://schemas.microsoft.com/office/drawing/2014/main" id="{6A385D8E-99CA-4AC3-915F-B7588F75E6E6}"/>
               </a:ext>
             </a:extLst>
           </p:cNvPr>
@@ -11055,7 +11026,7 @@
           <p:cNvPr id="36" name="Content Placeholder 8" descr="A close up of a device&#10;&#10;Description generated with high confidence">
             <a:extLst>
               <a:ext uri="{FF2B5EF4-FFF2-40B4-BE49-F238E27FC236}">
-                <a16:creationId xmlns:a16="http://schemas.microsoft.com/office/drawing/2014/main" xmlns="" id="{4DCA515B-FF18-4773-879C-D0DA14287EA4}"/>
+                <a16:creationId xmlns="" xmlns:a16="http://schemas.microsoft.com/office/drawing/2014/main" id="{4DCA515B-FF18-4773-879C-D0DA14287EA4}"/>
               </a:ext>
             </a:extLst>
           </p:cNvPr>
@@ -11100,7 +11071,7 @@
           <p:cNvPr id="37" name="Straight Connector 36">
             <a:extLst>
               <a:ext uri="{FF2B5EF4-FFF2-40B4-BE49-F238E27FC236}">
-                <a16:creationId xmlns:a16="http://schemas.microsoft.com/office/drawing/2014/main" xmlns="" id="{7A9CC6C6-26AC-4C9B-963B-9C13D9697B44}"/>
+                <a16:creationId xmlns="" xmlns:a16="http://schemas.microsoft.com/office/drawing/2014/main" id="{7A9CC6C6-26AC-4C9B-963B-9C13D9697B44}"/>
               </a:ext>
             </a:extLst>
           </p:cNvPr>
@@ -11142,7 +11113,7 @@
           <p:cNvPr id="33" name="Content Placeholder 5" descr="A circuit board&#10;&#10;Description generated with very high confidence">
             <a:extLst>
               <a:ext uri="{FF2B5EF4-FFF2-40B4-BE49-F238E27FC236}">
-                <a16:creationId xmlns:a16="http://schemas.microsoft.com/office/drawing/2014/main" xmlns="" id="{5E97ED60-7D5C-412E-BD73-CA59674ADA15}"/>
+                <a16:creationId xmlns="" xmlns:a16="http://schemas.microsoft.com/office/drawing/2014/main" id="{5E97ED60-7D5C-412E-BD73-CA59674ADA15}"/>
               </a:ext>
             </a:extLst>
           </p:cNvPr>
@@ -11196,7 +11167,7 @@
           <p:cNvPr id="40" name="Straight Connector 39">
             <a:extLst>
               <a:ext uri="{FF2B5EF4-FFF2-40B4-BE49-F238E27FC236}">
-                <a16:creationId xmlns:a16="http://schemas.microsoft.com/office/drawing/2014/main" xmlns="" id="{3502DCF6-F5E2-4DE3-9B56-35798FF187D8}"/>
+                <a16:creationId xmlns="" xmlns:a16="http://schemas.microsoft.com/office/drawing/2014/main" id="{3502DCF6-F5E2-4DE3-9B56-35798FF187D8}"/>
               </a:ext>
             </a:extLst>
           </p:cNvPr>
@@ -11241,7 +11212,7 @@
           <p:cNvPr id="41" name="Straight Connector 40">
             <a:extLst>
               <a:ext uri="{FF2B5EF4-FFF2-40B4-BE49-F238E27FC236}">
-                <a16:creationId xmlns:a16="http://schemas.microsoft.com/office/drawing/2014/main" xmlns="" id="{646C3ECD-1E1B-4EA5-888B-0E5F68D9A070}"/>
+                <a16:creationId xmlns="" xmlns:a16="http://schemas.microsoft.com/office/drawing/2014/main" id="{646C3ECD-1E1B-4EA5-888B-0E5F68D9A070}"/>
               </a:ext>
             </a:extLst>
           </p:cNvPr>
@@ -11283,7 +11254,7 @@
           <p:cNvPr id="21" name="Content Placeholder 5" descr="A circuit board&#10;&#10;Description generated with very high confidence">
             <a:extLst>
               <a:ext uri="{FF2B5EF4-FFF2-40B4-BE49-F238E27FC236}">
-                <a16:creationId xmlns:a16="http://schemas.microsoft.com/office/drawing/2014/main" xmlns="" id="{6D79CF16-C9A0-4673-AA2E-348378FF8194}"/>
+                <a16:creationId xmlns="" xmlns:a16="http://schemas.microsoft.com/office/drawing/2014/main" id="{6D79CF16-C9A0-4673-AA2E-348378FF8194}"/>
               </a:ext>
             </a:extLst>
           </p:cNvPr>
@@ -11337,7 +11308,7 @@
           <p:cNvPr id="20" name="Content Placeholder 5" descr="A circuit board&#10;&#10;Description generated with very high confidence">
             <a:extLst>
               <a:ext uri="{FF2B5EF4-FFF2-40B4-BE49-F238E27FC236}">
-                <a16:creationId xmlns:a16="http://schemas.microsoft.com/office/drawing/2014/main" xmlns="" id="{8DE2BD19-D59F-4A31-92EF-1B0D9E9D0FDB}"/>
+                <a16:creationId xmlns="" xmlns:a16="http://schemas.microsoft.com/office/drawing/2014/main" id="{8DE2BD19-D59F-4A31-92EF-1B0D9E9D0FDB}"/>
               </a:ext>
             </a:extLst>
           </p:cNvPr>
@@ -11391,7 +11362,7 @@
           <p:cNvPr id="22" name="Content Placeholder 5" descr="A circuit board&#10;&#10;Description generated with very high confidence">
             <a:extLst>
               <a:ext uri="{FF2B5EF4-FFF2-40B4-BE49-F238E27FC236}">
-                <a16:creationId xmlns:a16="http://schemas.microsoft.com/office/drawing/2014/main" xmlns="" id="{ADF143CE-9778-400F-8F41-742E440E5FBF}"/>
+                <a16:creationId xmlns="" xmlns:a16="http://schemas.microsoft.com/office/drawing/2014/main" id="{ADF143CE-9778-400F-8F41-742E440E5FBF}"/>
               </a:ext>
             </a:extLst>
           </p:cNvPr>
@@ -11445,7 +11416,7 @@
           <p:cNvPr id="26" name="Rectangle 25">
             <a:extLst>
               <a:ext uri="{FF2B5EF4-FFF2-40B4-BE49-F238E27FC236}">
-                <a16:creationId xmlns:a16="http://schemas.microsoft.com/office/drawing/2014/main" xmlns="" id="{B98378B0-F384-4BE8-9145-430E57DE03D7}"/>
+                <a16:creationId xmlns="" xmlns:a16="http://schemas.microsoft.com/office/drawing/2014/main" id="{B98378B0-F384-4BE8-9145-430E57DE03D7}"/>
               </a:ext>
             </a:extLst>
           </p:cNvPr>
@@ -11485,7 +11456,7 @@
           <p:cNvPr id="27" name="TextBox 26">
             <a:extLst>
               <a:ext uri="{FF2B5EF4-FFF2-40B4-BE49-F238E27FC236}">
-                <a16:creationId xmlns:a16="http://schemas.microsoft.com/office/drawing/2014/main" xmlns="" id="{069F82B7-3555-4F6A-ABB5-38813CE5FC85}"/>
+                <a16:creationId xmlns="" xmlns:a16="http://schemas.microsoft.com/office/drawing/2014/main" id="{069F82B7-3555-4F6A-ABB5-38813CE5FC85}"/>
               </a:ext>
             </a:extLst>
           </p:cNvPr>
@@ -11526,7 +11497,7 @@
           <p:cNvPr id="28" name="TextBox 27">
             <a:extLst>
               <a:ext uri="{FF2B5EF4-FFF2-40B4-BE49-F238E27FC236}">
-                <a16:creationId xmlns:a16="http://schemas.microsoft.com/office/drawing/2014/main" xmlns="" id="{1FE4C8C7-54FF-458B-98C0-1F9EBCC334C8}"/>
+                <a16:creationId xmlns="" xmlns:a16="http://schemas.microsoft.com/office/drawing/2014/main" id="{1FE4C8C7-54FF-458B-98C0-1F9EBCC334C8}"/>
               </a:ext>
             </a:extLst>
           </p:cNvPr>
@@ -11566,7 +11537,7 @@
           <p:cNvPr id="23" name="Rectangle 22">
             <a:extLst>
               <a:ext uri="{FF2B5EF4-FFF2-40B4-BE49-F238E27FC236}">
-                <a16:creationId xmlns:a16="http://schemas.microsoft.com/office/drawing/2014/main" xmlns="" id="{12D42B44-5C4F-49F5-8EFE-9A5058CD755F}"/>
+                <a16:creationId xmlns="" xmlns:a16="http://schemas.microsoft.com/office/drawing/2014/main" id="{12D42B44-5C4F-49F5-8EFE-9A5058CD755F}"/>
               </a:ext>
             </a:extLst>
           </p:cNvPr>
@@ -11882,7 +11853,7 @@
   <a:extraClrSchemeLst/>
   <a:extLst>
     <a:ext uri="{05A4C25C-085E-4340-85A3-A5531E510DB2}">
-      <thm15:themeFamily xmlns:thm15="http://schemas.microsoft.com/office/thememl/2012/main" xmlns="" name="Presentatie-NL-EA_1_0_13.potx" id="{5F6C1209-3523-440E-8533-DCE97EC5C651}" vid="{6C779022-81AC-4A5D-B0C5-44F49FEE6A6E}"/>
+      <thm15:themeFamily xmlns="" xmlns:thm15="http://schemas.microsoft.com/office/thememl/2012/main" name="Presentatie-NL-EA_1_0_13.potx" id="{5F6C1209-3523-440E-8533-DCE97EC5C651}" vid="{6C779022-81AC-4A5D-B0C5-44F49FEE6A6E}"/>
     </a:ext>
   </a:extLst>
 </a:theme>
@@ -12143,7 +12114,7 @@
   <a:extraClrSchemeLst/>
   <a:extLst>
     <a:ext uri="{05A4C25C-085E-4340-85A3-A5531E510DB2}">
-      <thm15:themeFamily xmlns:thm15="http://schemas.microsoft.com/office/thememl/2012/main" xmlns="" name="Office Theme" id="{62F939B6-93AF-4DB8-9C6B-D6C7DFDC589F}" vid="{4A3C46E8-61CC-4603-A589-7422A47A8E4A}"/>
+      <thm15:themeFamily xmlns="" xmlns:thm15="http://schemas.microsoft.com/office/thememl/2012/main" name="Office Theme" id="{62F939B6-93AF-4DB8-9C6B-D6C7DFDC589F}" vid="{4A3C46E8-61CC-4603-A589-7422A47A8E4A}"/>
     </a:ext>
   </a:extLst>
 </a:theme>

</xml_diff>